<commit_message>
react folder added and ppt added
</commit_message>
<xml_diff>
--- a/WT-II Lab Project Template.pptx
+++ b/WT-II Lab Project Template.pptx
@@ -13,7 +13,7 @@
     <p:sldId id="261" r:id="rId8"/>
   </p:sldIdLst>
   <p:sldSz cx="9144000" cy="6858000"/>
-  <p:notesSz cx="6797675" cy="9874250"/>
+  <p:notesSz cx="7559675" cy="10691812"/>
 </p:presentation>
 </file>
 
@@ -78,10 +78,8 @@
         <p:txBody>
           <a:bodyPr lIns="0" rIns="0" tIns="0" bIns="0" anchor="ctr"/>
           <a:p>
-            <a:endParaRPr b="0" lang="en-IN" sz="1400" spc="-1" strike="noStrike">
-              <a:solidFill>
-                <a:srgbClr val="000000"/>
-              </a:solidFill>
+            <a:pPr algn="ctr"/>
+            <a:endParaRPr b="0" lang="en-IN" sz="4400" spc="-1" strike="noStrike">
               <a:latin typeface="Arial"/>
             </a:endParaRPr>
           </a:p>
@@ -111,10 +109,7 @@
             <a:normAutofit/>
           </a:bodyPr>
           <a:p>
-            <a:endParaRPr b="0" lang="en-IN" sz="1400" spc="-1" strike="noStrike">
-              <a:solidFill>
-                <a:srgbClr val="000000"/>
-              </a:solidFill>
+            <a:endParaRPr b="0" lang="en-IN" sz="3200" spc="-1" strike="noStrike">
               <a:latin typeface="Arial"/>
             </a:endParaRPr>
           </a:p>
@@ -144,10 +139,7 @@
             <a:normAutofit/>
           </a:bodyPr>
           <a:p>
-            <a:endParaRPr b="0" lang="en-IN" sz="1400" spc="-1" strike="noStrike">
-              <a:solidFill>
-                <a:srgbClr val="000000"/>
-              </a:solidFill>
+            <a:endParaRPr b="0" lang="en-IN" sz="3200" spc="-1" strike="noStrike">
               <a:latin typeface="Arial"/>
             </a:endParaRPr>
           </a:p>
@@ -197,10 +189,8 @@
         <p:txBody>
           <a:bodyPr lIns="0" rIns="0" tIns="0" bIns="0" anchor="ctr"/>
           <a:p>
-            <a:endParaRPr b="0" lang="en-IN" sz="1400" spc="-1" strike="noStrike">
-              <a:solidFill>
-                <a:srgbClr val="000000"/>
-              </a:solidFill>
+            <a:pPr algn="ctr"/>
+            <a:endParaRPr b="0" lang="en-IN" sz="4400" spc="-1" strike="noStrike">
               <a:latin typeface="Arial"/>
             </a:endParaRPr>
           </a:p>
@@ -230,10 +220,7 @@
             <a:normAutofit/>
           </a:bodyPr>
           <a:p>
-            <a:endParaRPr b="0" lang="en-IN" sz="1400" spc="-1" strike="noStrike">
-              <a:solidFill>
-                <a:srgbClr val="000000"/>
-              </a:solidFill>
+            <a:endParaRPr b="0" lang="en-IN" sz="3200" spc="-1" strike="noStrike">
               <a:latin typeface="Arial"/>
             </a:endParaRPr>
           </a:p>
@@ -263,10 +250,7 @@
             <a:normAutofit/>
           </a:bodyPr>
           <a:p>
-            <a:endParaRPr b="0" lang="en-IN" sz="1400" spc="-1" strike="noStrike">
-              <a:solidFill>
-                <a:srgbClr val="000000"/>
-              </a:solidFill>
+            <a:endParaRPr b="0" lang="en-IN" sz="3200" spc="-1" strike="noStrike">
               <a:latin typeface="Arial"/>
             </a:endParaRPr>
           </a:p>
@@ -296,10 +280,7 @@
             <a:normAutofit/>
           </a:bodyPr>
           <a:p>
-            <a:endParaRPr b="0" lang="en-IN" sz="1400" spc="-1" strike="noStrike">
-              <a:solidFill>
-                <a:srgbClr val="000000"/>
-              </a:solidFill>
+            <a:endParaRPr b="0" lang="en-IN" sz="3200" spc="-1" strike="noStrike">
               <a:latin typeface="Arial"/>
             </a:endParaRPr>
           </a:p>
@@ -329,10 +310,7 @@
             <a:normAutofit/>
           </a:bodyPr>
           <a:p>
-            <a:endParaRPr b="0" lang="en-IN" sz="1400" spc="-1" strike="noStrike">
-              <a:solidFill>
-                <a:srgbClr val="000000"/>
-              </a:solidFill>
+            <a:endParaRPr b="0" lang="en-IN" sz="3200" spc="-1" strike="noStrike">
               <a:latin typeface="Arial"/>
             </a:endParaRPr>
           </a:p>
@@ -382,10 +360,8 @@
         <p:txBody>
           <a:bodyPr lIns="0" rIns="0" tIns="0" bIns="0" anchor="ctr"/>
           <a:p>
-            <a:endParaRPr b="0" lang="en-IN" sz="1400" spc="-1" strike="noStrike">
-              <a:solidFill>
-                <a:srgbClr val="000000"/>
-              </a:solidFill>
+            <a:pPr algn="ctr"/>
+            <a:endParaRPr b="0" lang="en-IN" sz="4400" spc="-1" strike="noStrike">
               <a:latin typeface="Arial"/>
             </a:endParaRPr>
           </a:p>
@@ -415,10 +391,7 @@
             <a:normAutofit/>
           </a:bodyPr>
           <a:p>
-            <a:endParaRPr b="0" lang="en-IN" sz="1400" spc="-1" strike="noStrike">
-              <a:solidFill>
-                <a:srgbClr val="000000"/>
-              </a:solidFill>
+            <a:endParaRPr b="0" lang="en-IN" sz="3200" spc="-1" strike="noStrike">
               <a:latin typeface="Arial"/>
             </a:endParaRPr>
           </a:p>
@@ -448,10 +421,7 @@
             <a:normAutofit/>
           </a:bodyPr>
           <a:p>
-            <a:endParaRPr b="0" lang="en-IN" sz="1400" spc="-1" strike="noStrike">
-              <a:solidFill>
-                <a:srgbClr val="000000"/>
-              </a:solidFill>
+            <a:endParaRPr b="0" lang="en-IN" sz="3200" spc="-1" strike="noStrike">
               <a:latin typeface="Arial"/>
             </a:endParaRPr>
           </a:p>
@@ -481,10 +451,7 @@
             <a:normAutofit/>
           </a:bodyPr>
           <a:p>
-            <a:endParaRPr b="0" lang="en-IN" sz="1400" spc="-1" strike="noStrike">
-              <a:solidFill>
-                <a:srgbClr val="000000"/>
-              </a:solidFill>
+            <a:endParaRPr b="0" lang="en-IN" sz="3200" spc="-1" strike="noStrike">
               <a:latin typeface="Arial"/>
             </a:endParaRPr>
           </a:p>
@@ -514,10 +481,7 @@
             <a:normAutofit/>
           </a:bodyPr>
           <a:p>
-            <a:endParaRPr b="0" lang="en-IN" sz="1400" spc="-1" strike="noStrike">
-              <a:solidFill>
-                <a:srgbClr val="000000"/>
-              </a:solidFill>
+            <a:endParaRPr b="0" lang="en-IN" sz="3200" spc="-1" strike="noStrike">
               <a:latin typeface="Arial"/>
             </a:endParaRPr>
           </a:p>
@@ -547,10 +511,7 @@
             <a:normAutofit/>
           </a:bodyPr>
           <a:p>
-            <a:endParaRPr b="0" lang="en-IN" sz="1400" spc="-1" strike="noStrike">
-              <a:solidFill>
-                <a:srgbClr val="000000"/>
-              </a:solidFill>
+            <a:endParaRPr b="0" lang="en-IN" sz="3200" spc="-1" strike="noStrike">
               <a:latin typeface="Arial"/>
             </a:endParaRPr>
           </a:p>
@@ -580,10 +541,7 @@
             <a:normAutofit/>
           </a:bodyPr>
           <a:p>
-            <a:endParaRPr b="0" lang="en-IN" sz="1400" spc="-1" strike="noStrike">
-              <a:solidFill>
-                <a:srgbClr val="000000"/>
-              </a:solidFill>
+            <a:endParaRPr b="0" lang="en-IN" sz="3200" spc="-1" strike="noStrike">
               <a:latin typeface="Arial"/>
             </a:endParaRPr>
           </a:p>
@@ -633,10 +591,8 @@
         <p:txBody>
           <a:bodyPr lIns="0" rIns="0" tIns="0" bIns="0" anchor="ctr"/>
           <a:p>
-            <a:endParaRPr b="0" lang="en-IN" sz="1400" spc="-1" strike="noStrike">
-              <a:solidFill>
-                <a:srgbClr val="000000"/>
-              </a:solidFill>
+            <a:pPr algn="ctr"/>
+            <a:endParaRPr b="0" lang="en-IN" sz="4400" spc="-1" strike="noStrike">
               <a:latin typeface="Arial"/>
             </a:endParaRPr>
           </a:p>
@@ -715,10 +671,8 @@
         <p:txBody>
           <a:bodyPr lIns="0" rIns="0" tIns="0" bIns="0" anchor="ctr"/>
           <a:p>
-            <a:endParaRPr b="0" lang="en-IN" sz="1400" spc="-1" strike="noStrike">
-              <a:solidFill>
-                <a:srgbClr val="000000"/>
-              </a:solidFill>
+            <a:pPr algn="ctr"/>
+            <a:endParaRPr b="0" lang="en-IN" sz="4400" spc="-1" strike="noStrike">
               <a:latin typeface="Arial"/>
             </a:endParaRPr>
           </a:p>
@@ -748,10 +702,7 @@
             <a:normAutofit/>
           </a:bodyPr>
           <a:p>
-            <a:endParaRPr b="0" lang="en-IN" sz="1400" spc="-1" strike="noStrike">
-              <a:solidFill>
-                <a:srgbClr val="000000"/>
-              </a:solidFill>
+            <a:endParaRPr b="0" lang="en-IN" sz="3200" spc="-1" strike="noStrike">
               <a:latin typeface="Arial"/>
             </a:endParaRPr>
           </a:p>
@@ -801,10 +752,8 @@
         <p:txBody>
           <a:bodyPr lIns="0" rIns="0" tIns="0" bIns="0" anchor="ctr"/>
           <a:p>
-            <a:endParaRPr b="0" lang="en-IN" sz="1400" spc="-1" strike="noStrike">
-              <a:solidFill>
-                <a:srgbClr val="000000"/>
-              </a:solidFill>
+            <a:pPr algn="ctr"/>
+            <a:endParaRPr b="0" lang="en-IN" sz="4400" spc="-1" strike="noStrike">
               <a:latin typeface="Arial"/>
             </a:endParaRPr>
           </a:p>
@@ -834,10 +783,7 @@
             <a:normAutofit/>
           </a:bodyPr>
           <a:p>
-            <a:endParaRPr b="0" lang="en-IN" sz="1400" spc="-1" strike="noStrike">
-              <a:solidFill>
-                <a:srgbClr val="000000"/>
-              </a:solidFill>
+            <a:endParaRPr b="0" lang="en-IN" sz="3200" spc="-1" strike="noStrike">
               <a:latin typeface="Arial"/>
             </a:endParaRPr>
           </a:p>
@@ -867,10 +813,7 @@
             <a:normAutofit/>
           </a:bodyPr>
           <a:p>
-            <a:endParaRPr b="0" lang="en-IN" sz="1400" spc="-1" strike="noStrike">
-              <a:solidFill>
-                <a:srgbClr val="000000"/>
-              </a:solidFill>
+            <a:endParaRPr b="0" lang="en-IN" sz="3200" spc="-1" strike="noStrike">
               <a:latin typeface="Arial"/>
             </a:endParaRPr>
           </a:p>
@@ -920,10 +863,8 @@
         <p:txBody>
           <a:bodyPr lIns="0" rIns="0" tIns="0" bIns="0" anchor="ctr"/>
           <a:p>
-            <a:endParaRPr b="0" lang="en-IN" sz="1400" spc="-1" strike="noStrike">
-              <a:solidFill>
-                <a:srgbClr val="000000"/>
-              </a:solidFill>
+            <a:pPr algn="ctr"/>
+            <a:endParaRPr b="0" lang="en-IN" sz="4400" spc="-1" strike="noStrike">
               <a:latin typeface="Arial"/>
             </a:endParaRPr>
           </a:p>
@@ -1024,10 +965,8 @@
         <p:txBody>
           <a:bodyPr lIns="0" rIns="0" tIns="0" bIns="0" anchor="ctr"/>
           <a:p>
-            <a:endParaRPr b="0" lang="en-IN" sz="1400" spc="-1" strike="noStrike">
-              <a:solidFill>
-                <a:srgbClr val="000000"/>
-              </a:solidFill>
+            <a:pPr algn="ctr"/>
+            <a:endParaRPr b="0" lang="en-IN" sz="4400" spc="-1" strike="noStrike">
               <a:latin typeface="Arial"/>
             </a:endParaRPr>
           </a:p>
@@ -1057,10 +996,7 @@
             <a:normAutofit/>
           </a:bodyPr>
           <a:p>
-            <a:endParaRPr b="0" lang="en-IN" sz="1400" spc="-1" strike="noStrike">
-              <a:solidFill>
-                <a:srgbClr val="000000"/>
-              </a:solidFill>
+            <a:endParaRPr b="0" lang="en-IN" sz="3200" spc="-1" strike="noStrike">
               <a:latin typeface="Arial"/>
             </a:endParaRPr>
           </a:p>
@@ -1090,10 +1026,7 @@
             <a:normAutofit/>
           </a:bodyPr>
           <a:p>
-            <a:endParaRPr b="0" lang="en-IN" sz="1400" spc="-1" strike="noStrike">
-              <a:solidFill>
-                <a:srgbClr val="000000"/>
-              </a:solidFill>
+            <a:endParaRPr b="0" lang="en-IN" sz="3200" spc="-1" strike="noStrike">
               <a:latin typeface="Arial"/>
             </a:endParaRPr>
           </a:p>
@@ -1123,10 +1056,7 @@
             <a:normAutofit/>
           </a:bodyPr>
           <a:p>
-            <a:endParaRPr b="0" lang="en-IN" sz="1400" spc="-1" strike="noStrike">
-              <a:solidFill>
-                <a:srgbClr val="000000"/>
-              </a:solidFill>
+            <a:endParaRPr b="0" lang="en-IN" sz="3200" spc="-1" strike="noStrike">
               <a:latin typeface="Arial"/>
             </a:endParaRPr>
           </a:p>
@@ -1176,10 +1106,8 @@
         <p:txBody>
           <a:bodyPr lIns="0" rIns="0" tIns="0" bIns="0" anchor="ctr"/>
           <a:p>
-            <a:endParaRPr b="0" lang="en-IN" sz="1400" spc="-1" strike="noStrike">
-              <a:solidFill>
-                <a:srgbClr val="000000"/>
-              </a:solidFill>
+            <a:pPr algn="ctr"/>
+            <a:endParaRPr b="0" lang="en-IN" sz="4400" spc="-1" strike="noStrike">
               <a:latin typeface="Arial"/>
             </a:endParaRPr>
           </a:p>
@@ -1209,10 +1137,7 @@
             <a:normAutofit/>
           </a:bodyPr>
           <a:p>
-            <a:endParaRPr b="0" lang="en-IN" sz="1400" spc="-1" strike="noStrike">
-              <a:solidFill>
-                <a:srgbClr val="000000"/>
-              </a:solidFill>
+            <a:endParaRPr b="0" lang="en-IN" sz="3200" spc="-1" strike="noStrike">
               <a:latin typeface="Arial"/>
             </a:endParaRPr>
           </a:p>
@@ -1242,10 +1167,7 @@
             <a:normAutofit/>
           </a:bodyPr>
           <a:p>
-            <a:endParaRPr b="0" lang="en-IN" sz="1400" spc="-1" strike="noStrike">
-              <a:solidFill>
-                <a:srgbClr val="000000"/>
-              </a:solidFill>
+            <a:endParaRPr b="0" lang="en-IN" sz="3200" spc="-1" strike="noStrike">
               <a:latin typeface="Arial"/>
             </a:endParaRPr>
           </a:p>
@@ -1275,10 +1197,7 @@
             <a:normAutofit/>
           </a:bodyPr>
           <a:p>
-            <a:endParaRPr b="0" lang="en-IN" sz="1400" spc="-1" strike="noStrike">
-              <a:solidFill>
-                <a:srgbClr val="000000"/>
-              </a:solidFill>
+            <a:endParaRPr b="0" lang="en-IN" sz="3200" spc="-1" strike="noStrike">
               <a:latin typeface="Arial"/>
             </a:endParaRPr>
           </a:p>
@@ -1328,10 +1247,8 @@
         <p:txBody>
           <a:bodyPr lIns="0" rIns="0" tIns="0" bIns="0" anchor="ctr"/>
           <a:p>
-            <a:endParaRPr b="0" lang="en-IN" sz="1400" spc="-1" strike="noStrike">
-              <a:solidFill>
-                <a:srgbClr val="000000"/>
-              </a:solidFill>
+            <a:pPr algn="ctr"/>
+            <a:endParaRPr b="0" lang="en-IN" sz="4400" spc="-1" strike="noStrike">
               <a:latin typeface="Arial"/>
             </a:endParaRPr>
           </a:p>
@@ -1361,10 +1278,7 @@
             <a:normAutofit/>
           </a:bodyPr>
           <a:p>
-            <a:endParaRPr b="0" lang="en-IN" sz="1400" spc="-1" strike="noStrike">
-              <a:solidFill>
-                <a:srgbClr val="000000"/>
-              </a:solidFill>
+            <a:endParaRPr b="0" lang="en-IN" sz="3200" spc="-1" strike="noStrike">
               <a:latin typeface="Arial"/>
             </a:endParaRPr>
           </a:p>
@@ -1394,10 +1308,7 @@
             <a:normAutofit/>
           </a:bodyPr>
           <a:p>
-            <a:endParaRPr b="0" lang="en-IN" sz="1400" spc="-1" strike="noStrike">
-              <a:solidFill>
-                <a:srgbClr val="000000"/>
-              </a:solidFill>
+            <a:endParaRPr b="0" lang="en-IN" sz="3200" spc="-1" strike="noStrike">
               <a:latin typeface="Arial"/>
             </a:endParaRPr>
           </a:p>
@@ -1427,10 +1338,7 @@
             <a:normAutofit/>
           </a:bodyPr>
           <a:p>
-            <a:endParaRPr b="0" lang="en-IN" sz="1400" spc="-1" strike="noStrike">
-              <a:solidFill>
-                <a:srgbClr val="000000"/>
-              </a:solidFill>
+            <a:endParaRPr b="0" lang="en-IN" sz="3200" spc="-1" strike="noStrike">
               <a:latin typeface="Arial"/>
             </a:endParaRPr>
           </a:p>
@@ -1478,7 +1386,7 @@
         <p:spPr>
           <a:xfrm>
             <a:off x="0" y="-13680"/>
-            <a:ext cx="9143640" cy="6933960"/>
+            <a:ext cx="9143280" cy="6933600"/>
           </a:xfrm>
           <a:prstGeom prst="rect">
             <a:avLst/>
@@ -1497,7 +1405,7 @@
         <p:spPr>
           <a:xfrm>
             <a:off x="0" y="152280"/>
-            <a:ext cx="1523520" cy="1199880"/>
+            <a:ext cx="1523160" cy="1199520"/>
           </a:xfrm>
           <a:prstGeom prst="rect">
             <a:avLst/>
@@ -1516,7 +1424,7 @@
           <a:fontRef idx="minor"/>
         </p:style>
         <p:txBody>
-          <a:bodyPr/>
+          <a:bodyPr lIns="90000" rIns="90000" tIns="45000" bIns="45000"/>
           <a:p>
             <a:pPr>
               <a:lnSpc>
@@ -1572,7 +1480,7 @@
         <p:spPr>
           <a:xfrm>
             <a:off x="312840" y="152280"/>
-            <a:ext cx="868320" cy="971640"/>
+            <a:ext cx="867960" cy="971280"/>
           </a:xfrm>
           <a:prstGeom prst="rect">
             <a:avLst/>
@@ -1591,7 +1499,7 @@
         <p:spPr>
           <a:xfrm>
             <a:off x="0" y="152280"/>
-            <a:ext cx="1447560" cy="1199880"/>
+            <a:ext cx="1447200" cy="1199520"/>
           </a:xfrm>
           <a:prstGeom prst="rect">
             <a:avLst/>
@@ -1610,7 +1518,7 @@
           <a:fontRef idx="minor"/>
         </p:style>
         <p:txBody>
-          <a:bodyPr/>
+          <a:bodyPr lIns="90000" rIns="90000" tIns="45000" bIns="45000"/>
           <a:p>
             <a:pPr>
               <a:lnSpc>
@@ -1666,7 +1574,7 @@
         <p:spPr>
           <a:xfrm>
             <a:off x="179640" y="152280"/>
-            <a:ext cx="868320" cy="971640"/>
+            <a:ext cx="867960" cy="971280"/>
           </a:xfrm>
           <a:prstGeom prst="rect">
             <a:avLst/>
@@ -1689,7 +1597,7 @@
         <p:spPr>
           <a:xfrm>
             <a:off x="7530120" y="1676520"/>
-            <a:ext cx="1599840" cy="5050440"/>
+            <a:ext cx="1599480" cy="5050080"/>
           </a:xfrm>
           <a:prstGeom prst="rect">
             <a:avLst/>
@@ -1712,7 +1620,7 @@
         <p:spPr>
           <a:xfrm>
             <a:off x="1219320" y="152280"/>
-            <a:ext cx="7924320" cy="1074240"/>
+            <a:ext cx="7923960" cy="1073880"/>
           </a:xfrm>
           <a:prstGeom prst="rect">
             <a:avLst/>
@@ -1744,19 +1652,14 @@
         <p:txBody>
           <a:bodyPr lIns="0" rIns="0" tIns="0" bIns="0" anchor="ctr"/>
           <a:p>
-            <a:r>
-              <a:rPr b="0" lang="en-IN" sz="1400" spc="-1" strike="noStrike">
-                <a:solidFill>
-                  <a:srgbClr val="000000"/>
-                </a:solidFill>
+            <a:pPr algn="ctr"/>
+            <a:r>
+              <a:rPr b="0" lang="en-IN" sz="4400" spc="-1" strike="noStrike">
                 <a:latin typeface="Arial"/>
               </a:rPr>
               <a:t>Click to edit the title text format</a:t>
             </a:r>
-            <a:endParaRPr b="0" lang="en-IN" sz="1400" spc="-1" strike="noStrike">
-              <a:solidFill>
-                <a:srgbClr val="000000"/>
-              </a:solidFill>
+            <a:endParaRPr b="0" lang="en-IN" sz="4400" spc="-1" strike="noStrike">
               <a:latin typeface="Arial"/>
             </a:endParaRPr>
           </a:p>
@@ -1798,18 +1701,12 @@
               <a:buChar char=""/>
             </a:pPr>
             <a:r>
-              <a:rPr b="0" lang="en-IN" sz="1400" spc="-1" strike="noStrike">
-                <a:solidFill>
-                  <a:srgbClr val="000000"/>
-                </a:solidFill>
+              <a:rPr b="0" lang="en-IN" sz="3200" spc="-1" strike="noStrike">
                 <a:latin typeface="Arial"/>
               </a:rPr>
               <a:t>Click to edit the outline text format</a:t>
             </a:r>
-            <a:endParaRPr b="0" lang="en-IN" sz="1400" spc="-1" strike="noStrike">
-              <a:solidFill>
-                <a:srgbClr val="000000"/>
-              </a:solidFill>
+            <a:endParaRPr b="0" lang="en-IN" sz="3200" spc="-1" strike="noStrike">
               <a:latin typeface="Arial"/>
             </a:endParaRPr>
           </a:p>
@@ -1826,18 +1723,12 @@
               <a:buChar char=""/>
             </a:pPr>
             <a:r>
-              <a:rPr b="0" lang="en-IN" sz="1400" spc="-1" strike="noStrike">
-                <a:solidFill>
-                  <a:srgbClr val="000000"/>
-                </a:solidFill>
+              <a:rPr b="0" lang="en-IN" sz="2800" spc="-1" strike="noStrike">
                 <a:latin typeface="Arial"/>
               </a:rPr>
               <a:t>Second Outline Level</a:t>
             </a:r>
-            <a:endParaRPr b="0" lang="en-IN" sz="1400" spc="-1" strike="noStrike">
-              <a:solidFill>
-                <a:srgbClr val="000000"/>
-              </a:solidFill>
+            <a:endParaRPr b="0" lang="en-IN" sz="2800" spc="-1" strike="noStrike">
               <a:latin typeface="Arial"/>
             </a:endParaRPr>
           </a:p>
@@ -1854,18 +1745,12 @@
               <a:buChar char=""/>
             </a:pPr>
             <a:r>
-              <a:rPr b="0" lang="en-IN" sz="1400" spc="-1" strike="noStrike">
-                <a:solidFill>
-                  <a:srgbClr val="000000"/>
-                </a:solidFill>
+              <a:rPr b="0" lang="en-IN" sz="2400" spc="-1" strike="noStrike">
                 <a:latin typeface="Arial"/>
               </a:rPr>
               <a:t>Third Outline Level</a:t>
             </a:r>
-            <a:endParaRPr b="0" lang="en-IN" sz="1400" spc="-1" strike="noStrike">
-              <a:solidFill>
-                <a:srgbClr val="000000"/>
-              </a:solidFill>
+            <a:endParaRPr b="0" lang="en-IN" sz="2400" spc="-1" strike="noStrike">
               <a:latin typeface="Arial"/>
             </a:endParaRPr>
           </a:p>
@@ -1882,18 +1767,12 @@
               <a:buChar char=""/>
             </a:pPr>
             <a:r>
-              <a:rPr b="0" lang="en-IN" sz="1400" spc="-1" strike="noStrike">
-                <a:solidFill>
-                  <a:srgbClr val="000000"/>
-                </a:solidFill>
+              <a:rPr b="0" lang="en-IN" sz="2000" spc="-1" strike="noStrike">
                 <a:latin typeface="Arial"/>
               </a:rPr>
               <a:t>Fourth Outline Level</a:t>
             </a:r>
-            <a:endParaRPr b="0" lang="en-IN" sz="1400" spc="-1" strike="noStrike">
-              <a:solidFill>
-                <a:srgbClr val="000000"/>
-              </a:solidFill>
+            <a:endParaRPr b="0" lang="en-IN" sz="2000" spc="-1" strike="noStrike">
               <a:latin typeface="Arial"/>
             </a:endParaRPr>
           </a:p>
@@ -1911,17 +1790,11 @@
             </a:pPr>
             <a:r>
               <a:rPr b="0" lang="en-IN" sz="2000" spc="-1" strike="noStrike">
-                <a:solidFill>
-                  <a:srgbClr val="000000"/>
-                </a:solidFill>
                 <a:latin typeface="Arial"/>
               </a:rPr>
               <a:t>Fifth Outline Level</a:t>
             </a:r>
             <a:endParaRPr b="0" lang="en-IN" sz="2000" spc="-1" strike="noStrike">
-              <a:solidFill>
-                <a:srgbClr val="000000"/>
-              </a:solidFill>
               <a:latin typeface="Arial"/>
             </a:endParaRPr>
           </a:p>
@@ -1939,17 +1812,11 @@
             </a:pPr>
             <a:r>
               <a:rPr b="0" lang="en-IN" sz="2000" spc="-1" strike="noStrike">
-                <a:solidFill>
-                  <a:srgbClr val="000000"/>
-                </a:solidFill>
                 <a:latin typeface="Arial"/>
               </a:rPr>
               <a:t>Sixth Outline Level</a:t>
             </a:r>
             <a:endParaRPr b="0" lang="en-IN" sz="2000" spc="-1" strike="noStrike">
-              <a:solidFill>
-                <a:srgbClr val="000000"/>
-              </a:solidFill>
               <a:latin typeface="Arial"/>
             </a:endParaRPr>
           </a:p>
@@ -1967,17 +1834,11 @@
             </a:pPr>
             <a:r>
               <a:rPr b="0" lang="en-IN" sz="2000" spc="-1" strike="noStrike">
-                <a:solidFill>
-                  <a:srgbClr val="000000"/>
-                </a:solidFill>
                 <a:latin typeface="Arial"/>
               </a:rPr>
               <a:t>Seventh Outline Level</a:t>
             </a:r>
             <a:endParaRPr b="0" lang="en-IN" sz="2000" spc="-1" strike="noStrike">
-              <a:solidFill>
-                <a:srgbClr val="000000"/>
-              </a:solidFill>
               <a:latin typeface="Arial"/>
             </a:endParaRPr>
           </a:p>
@@ -2029,7 +1890,7 @@
         <p:spPr>
           <a:xfrm>
             <a:off x="421560" y="1540080"/>
-            <a:ext cx="8300520" cy="1323000"/>
+            <a:ext cx="8300160" cy="1322640"/>
           </a:xfrm>
           <a:prstGeom prst="rect">
             <a:avLst/>
@@ -2046,7 +1907,7 @@
           <a:fontRef idx="minor"/>
         </p:style>
         <p:txBody>
-          <a:bodyPr/>
+          <a:bodyPr lIns="90000" rIns="90000" tIns="45000" bIns="45000"/>
           <a:p>
             <a:pPr algn="ctr">
               <a:lnSpc>
@@ -2138,7 +1999,7 @@
         <p:spPr>
           <a:xfrm>
             <a:off x="411480" y="4719240"/>
-            <a:ext cx="8457840" cy="1371600"/>
+            <a:ext cx="8457480" cy="1371240"/>
           </a:xfrm>
           <a:prstGeom prst="rect">
             <a:avLst/>
@@ -2155,7 +2016,7 @@
           <a:fontRef idx="minor"/>
         </p:style>
         <p:txBody>
-          <a:bodyPr/>
+          <a:bodyPr lIns="90000" rIns="90000" tIns="45000" bIns="45000"/>
           <a:p>
             <a:pPr>
               <a:lnSpc>
@@ -2426,7 +2287,7 @@
         <p:spPr>
           <a:xfrm>
             <a:off x="1523880" y="1581120"/>
-            <a:ext cx="7619760" cy="36000"/>
+            <a:ext cx="7619400" cy="35640"/>
           </a:xfrm>
           <a:prstGeom prst="rect">
             <a:avLst/>
@@ -2454,7 +2315,7 @@
         <p:spPr>
           <a:xfrm>
             <a:off x="2666880" y="1143000"/>
-            <a:ext cx="6476760" cy="461160"/>
+            <a:ext cx="6476400" cy="460800"/>
           </a:xfrm>
           <a:prstGeom prst="rect">
             <a:avLst/>
@@ -2471,9 +2332,9 @@
           <a:fontRef idx="minor"/>
         </p:style>
         <p:txBody>
-          <a:bodyPr/>
-          <a:p>
-            <a:pPr marL="343080" indent="-342720" algn="r">
+          <a:bodyPr lIns="90000" rIns="90000" tIns="45000" bIns="45000"/>
+          <a:p>
+            <a:pPr marL="343080" indent="-342360" algn="r">
               <a:lnSpc>
                 <a:spcPct val="100000"/>
               </a:lnSpc>
@@ -2496,14 +2357,14 @@
       </p:sp>
       <p:sp>
         <p:nvSpPr>
-          <p:cNvPr id="49" name="TextShape 3"/>
-          <p:cNvSpPr txBox="1"/>
+          <p:cNvPr id="49" name="CustomShape 3"/>
+          <p:cNvSpPr/>
           <p:nvPr/>
         </p:nvSpPr>
         <p:spPr>
           <a:xfrm>
             <a:off x="576000" y="2016000"/>
-            <a:ext cx="7056000" cy="2394000"/>
+            <a:ext cx="7055640" cy="2393640"/>
           </a:xfrm>
           <a:prstGeom prst="rect">
             <a:avLst/>
@@ -2513,41 +2374,72 @@
             <a:noFill/>
           </a:ln>
         </p:spPr>
+        <p:style>
+          <a:lnRef idx="0"/>
+          <a:fillRef idx="0"/>
+          <a:effectRef idx="0"/>
+          <a:fontRef idx="minor"/>
+        </p:style>
         <p:txBody>
           <a:bodyPr lIns="90000" rIns="90000" tIns="45000" bIns="45000"/>
           <a:p>
+            <a:pPr>
+              <a:lnSpc>
+                <a:spcPct val="100000"/>
+              </a:lnSpc>
+            </a:pPr>
             <a:r>
               <a:rPr b="0" lang="en-IN" sz="1800" spc="-1" strike="noStrike">
                 <a:latin typeface="Arial"/>
               </a:rPr>
-              <a:t>The project is basically for the teachers to evaluate their students answers automatically instead of manually correcting them.</a:t>
-            </a:r>
-            <a:endParaRPr b="0" lang="en-IN" sz="1800" spc="-1" strike="noStrike">
-              <a:latin typeface="Arial"/>
-            </a:endParaRPr>
-          </a:p>
-          <a:p>
-            <a:endParaRPr b="0" lang="en-IN" sz="1800" spc="-1" strike="noStrike">
-              <a:latin typeface="Arial"/>
-            </a:endParaRPr>
-          </a:p>
-          <a:p>
+              <a:t>The project is basically for the teachers to evaluate their students answers against the model answers automatically instead of manually correcting them using Natural Language Processing technique/algorithm.</a:t>
+            </a:r>
+            <a:endParaRPr b="0" lang="en-IN" sz="1800" spc="-1" strike="noStrike">
+              <a:latin typeface="Arial"/>
+            </a:endParaRPr>
+          </a:p>
+          <a:p>
+            <a:pPr>
+              <a:lnSpc>
+                <a:spcPct val="100000"/>
+              </a:lnSpc>
+            </a:pPr>
+            <a:endParaRPr b="0" lang="en-IN" sz="1800" spc="-1" strike="noStrike">
+              <a:latin typeface="Arial"/>
+            </a:endParaRPr>
+          </a:p>
+          <a:p>
+            <a:pPr>
+              <a:lnSpc>
+                <a:spcPct val="100000"/>
+              </a:lnSpc>
+            </a:pPr>
             <a:r>
               <a:rPr b="0" lang="en-IN" sz="1800" spc="-1" strike="noStrike">
                 <a:latin typeface="Arial"/>
               </a:rPr>
-              <a:t>It evaluates the students answer with that of the teachers answers and based on how close it is to the required answer it allocates marks for that question.</a:t>
-            </a:r>
-            <a:endParaRPr b="0" lang="en-IN" sz="1800" spc="-1" strike="noStrike">
-              <a:latin typeface="Arial"/>
-            </a:endParaRPr>
-          </a:p>
-          <a:p>
-            <a:endParaRPr b="0" lang="en-IN" sz="1800" spc="-1" strike="noStrike">
-              <a:latin typeface="Arial"/>
-            </a:endParaRPr>
-          </a:p>
-          <a:p>
+              <a:t>It evaluates the students answer with that of the teachers answers and based on how close it is to the required answer it allocates marks for that answer to that particular student</a:t>
+            </a:r>
+            <a:endParaRPr b="0" lang="en-IN" sz="1800" spc="-1" strike="noStrike">
+              <a:latin typeface="Arial"/>
+            </a:endParaRPr>
+          </a:p>
+          <a:p>
+            <a:pPr>
+              <a:lnSpc>
+                <a:spcPct val="100000"/>
+              </a:lnSpc>
+            </a:pPr>
+            <a:endParaRPr b="0" lang="en-IN" sz="1800" spc="-1" strike="noStrike">
+              <a:latin typeface="Arial"/>
+            </a:endParaRPr>
+          </a:p>
+          <a:p>
+            <a:pPr>
+              <a:lnSpc>
+                <a:spcPct val="100000"/>
+              </a:lnSpc>
+            </a:pPr>
             <a:r>
               <a:rPr b="0" lang="en-IN" sz="1800" spc="-1" strike="noStrike">
                 <a:latin typeface="Arial"/>
@@ -2618,7 +2510,7 @@
         <p:spPr>
           <a:xfrm>
             <a:off x="1523880" y="1581120"/>
-            <a:ext cx="7619760" cy="36000"/>
+            <a:ext cx="7619400" cy="35640"/>
           </a:xfrm>
           <a:prstGeom prst="rect">
             <a:avLst/>
@@ -2646,7 +2538,7 @@
         <p:spPr>
           <a:xfrm>
             <a:off x="2666880" y="1143000"/>
-            <a:ext cx="6476760" cy="461160"/>
+            <a:ext cx="6476400" cy="460800"/>
           </a:xfrm>
           <a:prstGeom prst="rect">
             <a:avLst/>
@@ -2663,9 +2555,9 @@
           <a:fontRef idx="minor"/>
         </p:style>
         <p:txBody>
-          <a:bodyPr/>
-          <a:p>
-            <a:pPr marL="343080" indent="-342720" algn="r">
+          <a:bodyPr lIns="90000" rIns="90000" tIns="45000" bIns="45000"/>
+          <a:p>
+            <a:pPr marL="343080" indent="-342360" algn="r">
               <a:lnSpc>
                 <a:spcPct val="100000"/>
               </a:lnSpc>
@@ -2688,14 +2580,14 @@
       </p:sp>
       <p:sp>
         <p:nvSpPr>
-          <p:cNvPr id="52" name="TextShape 3"/>
-          <p:cNvSpPr txBox="1"/>
+          <p:cNvPr id="52" name="CustomShape 3"/>
+          <p:cNvSpPr/>
           <p:nvPr/>
         </p:nvSpPr>
         <p:spPr>
           <a:xfrm>
             <a:off x="504000" y="2016000"/>
-            <a:ext cx="6984000" cy="3417840"/>
+            <a:ext cx="6983640" cy="3417480"/>
           </a:xfrm>
           <a:prstGeom prst="rect">
             <a:avLst/>
@@ -2705,9 +2597,20 @@
             <a:noFill/>
           </a:ln>
         </p:spPr>
+        <p:style>
+          <a:lnRef idx="0"/>
+          <a:fillRef idx="0"/>
+          <a:effectRef idx="0"/>
+          <a:fontRef idx="minor"/>
+        </p:style>
         <p:txBody>
           <a:bodyPr lIns="90000" rIns="90000" tIns="45000" bIns="45000"/>
           <a:p>
+            <a:pPr>
+              <a:lnSpc>
+                <a:spcPct val="100000"/>
+              </a:lnSpc>
+            </a:pPr>
             <a:r>
               <a:rPr b="0" lang="en-IN" sz="1800" spc="-1" strike="noStrike">
                 <a:latin typeface="Arial"/>
@@ -2719,11 +2622,21 @@
             </a:endParaRPr>
           </a:p>
           <a:p>
-            <a:endParaRPr b="0" lang="en-IN" sz="1800" spc="-1" strike="noStrike">
-              <a:latin typeface="Arial"/>
-            </a:endParaRPr>
-          </a:p>
-          <a:p>
+            <a:pPr>
+              <a:lnSpc>
+                <a:spcPct val="100000"/>
+              </a:lnSpc>
+            </a:pPr>
+            <a:endParaRPr b="0" lang="en-IN" sz="1800" spc="-1" strike="noStrike">
+              <a:latin typeface="Arial"/>
+            </a:endParaRPr>
+          </a:p>
+          <a:p>
+            <a:pPr>
+              <a:lnSpc>
+                <a:spcPct val="100000"/>
+              </a:lnSpc>
+            </a:pPr>
             <a:r>
               <a:rPr b="0" lang="en-IN" sz="1800" spc="-1" strike="noStrike">
                 <a:latin typeface="Arial"/>
@@ -2735,6 +2648,11 @@
             </a:endParaRPr>
           </a:p>
           <a:p>
+            <a:pPr>
+              <a:lnSpc>
+                <a:spcPct val="100000"/>
+              </a:lnSpc>
+            </a:pPr>
             <a:r>
               <a:rPr b="0" lang="en-IN" sz="1800" spc="-1" strike="noStrike">
                 <a:latin typeface="Arial"/>
@@ -2752,6 +2670,11 @@
             </a:endParaRPr>
           </a:p>
           <a:p>
+            <a:pPr>
+              <a:lnSpc>
+                <a:spcPct val="100000"/>
+              </a:lnSpc>
+            </a:pPr>
             <a:r>
               <a:rPr b="0" lang="en-IN" sz="1800" spc="-1" strike="noStrike">
                 <a:latin typeface="Arial"/>
@@ -2769,6 +2692,11 @@
             </a:endParaRPr>
           </a:p>
           <a:p>
+            <a:pPr>
+              <a:lnSpc>
+                <a:spcPct val="100000"/>
+              </a:lnSpc>
+            </a:pPr>
             <a:r>
               <a:rPr b="0" lang="en-IN" sz="1800" spc="-1" strike="noStrike">
                 <a:latin typeface="Arial"/>
@@ -2786,11 +2714,21 @@
             </a:endParaRPr>
           </a:p>
           <a:p>
-            <a:endParaRPr b="0" lang="en-IN" sz="1800" spc="-1" strike="noStrike">
-              <a:latin typeface="Arial"/>
-            </a:endParaRPr>
-          </a:p>
-          <a:p>
+            <a:pPr>
+              <a:lnSpc>
+                <a:spcPct val="100000"/>
+              </a:lnSpc>
+            </a:pPr>
+            <a:endParaRPr b="0" lang="en-IN" sz="1800" spc="-1" strike="noStrike">
+              <a:latin typeface="Arial"/>
+            </a:endParaRPr>
+          </a:p>
+          <a:p>
+            <a:pPr>
+              <a:lnSpc>
+                <a:spcPct val="100000"/>
+              </a:lnSpc>
+            </a:pPr>
             <a:r>
               <a:rPr b="0" lang="en-IN" sz="1800" spc="-1" strike="noStrike">
                 <a:latin typeface="Arial"/>
@@ -2802,6 +2740,11 @@
             </a:endParaRPr>
           </a:p>
           <a:p>
+            <a:pPr>
+              <a:lnSpc>
+                <a:spcPct val="100000"/>
+              </a:lnSpc>
+            </a:pPr>
             <a:r>
               <a:rPr b="0" lang="en-IN" sz="1800" spc="-1" strike="noStrike">
                 <a:latin typeface="Arial"/>
@@ -2819,6 +2762,11 @@
             </a:endParaRPr>
           </a:p>
           <a:p>
+            <a:pPr>
+              <a:lnSpc>
+                <a:spcPct val="100000"/>
+              </a:lnSpc>
+            </a:pPr>
             <a:r>
               <a:rPr b="0" lang="en-IN" sz="1800" spc="-1" strike="noStrike">
                 <a:latin typeface="Arial"/>
@@ -2836,6 +2784,11 @@
             </a:endParaRPr>
           </a:p>
           <a:p>
+            <a:pPr>
+              <a:lnSpc>
+                <a:spcPct val="100000"/>
+              </a:lnSpc>
+            </a:pPr>
             <a:r>
               <a:rPr b="0" lang="en-IN" sz="1800" spc="-1" strike="noStrike">
                 <a:latin typeface="Arial"/>
@@ -2846,18 +2799,28 @@
               <a:rPr b="0" lang="en-IN" sz="1800" spc="-1" strike="noStrike">
                 <a:latin typeface="Arial"/>
               </a:rPr>
-              <a:t>iii)PHP</a:t>
-            </a:r>
-            <a:endParaRPr b="0" lang="en-IN" sz="1800" spc="-1" strike="noStrike">
-              <a:latin typeface="Arial"/>
-            </a:endParaRPr>
-          </a:p>
-          <a:p>
-            <a:endParaRPr b="0" lang="en-IN" sz="1800" spc="-1" strike="noStrike">
-              <a:latin typeface="Arial"/>
-            </a:endParaRPr>
-          </a:p>
-          <a:p>
+              <a:t>iii)AJAX</a:t>
+            </a:r>
+            <a:endParaRPr b="0" lang="en-IN" sz="1800" spc="-1" strike="noStrike">
+              <a:latin typeface="Arial"/>
+            </a:endParaRPr>
+          </a:p>
+          <a:p>
+            <a:pPr>
+              <a:lnSpc>
+                <a:spcPct val="100000"/>
+              </a:lnSpc>
+            </a:pPr>
+            <a:endParaRPr b="0" lang="en-IN" sz="1800" spc="-1" strike="noStrike">
+              <a:latin typeface="Arial"/>
+            </a:endParaRPr>
+          </a:p>
+          <a:p>
+            <a:pPr>
+              <a:lnSpc>
+                <a:spcPct val="100000"/>
+              </a:lnSpc>
+            </a:pPr>
             <a:r>
               <a:rPr b="0" lang="en-IN" sz="1800" spc="-1" strike="noStrike">
                 <a:latin typeface="Arial"/>
@@ -2928,7 +2891,7 @@
         <p:spPr>
           <a:xfrm>
             <a:off x="1523880" y="1581120"/>
-            <a:ext cx="7619760" cy="36000"/>
+            <a:ext cx="7619400" cy="35640"/>
           </a:xfrm>
           <a:prstGeom prst="rect">
             <a:avLst/>
@@ -2956,7 +2919,7 @@
         <p:spPr>
           <a:xfrm>
             <a:off x="2666880" y="1143000"/>
-            <a:ext cx="6476760" cy="461160"/>
+            <a:ext cx="6476400" cy="460800"/>
           </a:xfrm>
           <a:prstGeom prst="rect">
             <a:avLst/>
@@ -2973,9 +2936,9 @@
           <a:fontRef idx="minor"/>
         </p:style>
         <p:txBody>
-          <a:bodyPr/>
-          <a:p>
-            <a:pPr marL="343080" indent="-342720" algn="r">
+          <a:bodyPr lIns="90000" rIns="90000" tIns="45000" bIns="45000"/>
+          <a:p>
+            <a:pPr marL="343080" indent="-342360" algn="r">
               <a:lnSpc>
                 <a:spcPct val="100000"/>
               </a:lnSpc>
@@ -2998,14 +2961,14 @@
       </p:sp>
       <p:sp>
         <p:nvSpPr>
-          <p:cNvPr id="55" name="TextShape 3"/>
-          <p:cNvSpPr txBox="1"/>
+          <p:cNvPr id="55" name="CustomShape 3"/>
+          <p:cNvSpPr/>
           <p:nvPr/>
         </p:nvSpPr>
         <p:spPr>
           <a:xfrm>
             <a:off x="720000" y="2160000"/>
-            <a:ext cx="6912000" cy="1114200"/>
+            <a:ext cx="6911640" cy="1113840"/>
           </a:xfrm>
           <a:prstGeom prst="rect">
             <a:avLst/>
@@ -3015,9 +2978,20 @@
             <a:noFill/>
           </a:ln>
         </p:spPr>
+        <p:style>
+          <a:lnRef idx="0"/>
+          <a:fillRef idx="0"/>
+          <a:effectRef idx="0"/>
+          <a:fontRef idx="minor"/>
+        </p:style>
         <p:txBody>
           <a:bodyPr lIns="90000" rIns="90000" tIns="45000" bIns="45000"/>
           <a:p>
+            <a:pPr>
+              <a:lnSpc>
+                <a:spcPct val="100000"/>
+              </a:lnSpc>
+            </a:pPr>
             <a:r>
               <a:rPr b="0" lang="en-IN" sz="1800" spc="-1" strike="noStrike">
                 <a:latin typeface="Arial"/>
@@ -3029,16 +3003,78 @@
             </a:endParaRPr>
           </a:p>
           <a:p>
-            <a:endParaRPr b="0" lang="en-IN" sz="1800" spc="-1" strike="noStrike">
-              <a:latin typeface="Arial"/>
-            </a:endParaRPr>
-          </a:p>
-          <a:p>
+            <a:pPr>
+              <a:lnSpc>
+                <a:spcPct val="100000"/>
+              </a:lnSpc>
+            </a:pPr>
+            <a:endParaRPr b="0" lang="en-IN" sz="1800" spc="-1" strike="noStrike">
+              <a:latin typeface="Arial"/>
+            </a:endParaRPr>
+          </a:p>
+          <a:p>
+            <a:pPr>
+              <a:lnSpc>
+                <a:spcPct val="100000"/>
+              </a:lnSpc>
+            </a:pPr>
             <a:r>
               <a:rPr b="0" lang="en-IN" sz="1800" spc="-1" strike="noStrike">
                 <a:latin typeface="Arial"/>
               </a:rPr>
-              <a:t>We have implemented 2 Ajax Patterns : Submission Throttling and Multistage Downlaod</a:t>
+              <a:t>We have implemented 2 Ajax Patterns : Submission Throttling and Multistage Downlaod.</a:t>
+            </a:r>
+            <a:endParaRPr b="0" lang="en-IN" sz="1800" spc="-1" strike="noStrike">
+              <a:latin typeface="Arial"/>
+            </a:endParaRPr>
+          </a:p>
+          <a:p>
+            <a:pPr>
+              <a:lnSpc>
+                <a:spcPct val="100000"/>
+              </a:lnSpc>
+            </a:pPr>
+            <a:endParaRPr b="0" lang="en-IN" sz="1800" spc="-1" strike="noStrike">
+              <a:latin typeface="Arial"/>
+            </a:endParaRPr>
+          </a:p>
+          <a:p>
+            <a:pPr>
+              <a:lnSpc>
+                <a:spcPct val="100000"/>
+              </a:lnSpc>
+            </a:pPr>
+            <a:r>
+              <a:rPr b="0" lang="en-IN" sz="1800" spc="-1" strike="noStrike">
+                <a:latin typeface="Arial"/>
+              </a:rPr>
+              <a:t>Submission Throttling is implemented while searching for the students name among a huge lot of students either to see the result or to modify them.</a:t>
+            </a:r>
+            <a:endParaRPr b="0" lang="en-IN" sz="1800" spc="-1" strike="noStrike">
+              <a:latin typeface="Arial"/>
+            </a:endParaRPr>
+          </a:p>
+          <a:p>
+            <a:pPr>
+              <a:lnSpc>
+                <a:spcPct val="100000"/>
+              </a:lnSpc>
+            </a:pPr>
+            <a:endParaRPr b="0" lang="en-IN" sz="1800" spc="-1" strike="noStrike">
+              <a:latin typeface="Arial"/>
+            </a:endParaRPr>
+          </a:p>
+          <a:p>
+            <a:pPr>
+              <a:lnSpc>
+                <a:spcPct val="100000"/>
+              </a:lnSpc>
+            </a:pPr>
+            <a:r>
+              <a:rPr b="0" lang="en-IN" sz="1800" spc="-1" strike="noStrike">
+                <a:latin typeface="Arial"/>
+              </a:rPr>
+              <a:t>Multistage Download in implemented while reviewing the answers.Since there will be a lot answers written by the student.We have used multistage download technique to provide those answers in batches.</a:t>
             </a:r>
             <a:endParaRPr b="0" lang="en-IN" sz="1800" spc="-1" strike="noStrike">
               <a:latin typeface="Arial"/>
@@ -3104,7 +3140,7 @@
         <p:spPr>
           <a:xfrm>
             <a:off x="1523880" y="1581120"/>
-            <a:ext cx="7619760" cy="36000"/>
+            <a:ext cx="7619400" cy="35640"/>
           </a:xfrm>
           <a:prstGeom prst="rect">
             <a:avLst/>
@@ -3132,7 +3168,7 @@
         <p:spPr>
           <a:xfrm>
             <a:off x="2666880" y="1143000"/>
-            <a:ext cx="6476760" cy="461160"/>
+            <a:ext cx="6476400" cy="460800"/>
           </a:xfrm>
           <a:prstGeom prst="rect">
             <a:avLst/>
@@ -3149,9 +3185,9 @@
           <a:fontRef idx="minor"/>
         </p:style>
         <p:txBody>
-          <a:bodyPr/>
-          <a:p>
-            <a:pPr marL="343080" indent="-342720" algn="r">
+          <a:bodyPr lIns="90000" rIns="90000" tIns="45000" bIns="45000"/>
+          <a:p>
+            <a:pPr marL="343080" indent="-342360" algn="r">
               <a:lnSpc>
                 <a:spcPct val="100000"/>
               </a:lnSpc>
@@ -3174,14 +3210,14 @@
       </p:sp>
       <p:sp>
         <p:nvSpPr>
-          <p:cNvPr id="58" name="TextShape 3"/>
-          <p:cNvSpPr txBox="1"/>
+          <p:cNvPr id="58" name="CustomShape 3"/>
+          <p:cNvSpPr/>
           <p:nvPr/>
         </p:nvSpPr>
         <p:spPr>
           <a:xfrm>
             <a:off x="792000" y="2088000"/>
-            <a:ext cx="1296000" cy="346320"/>
+            <a:ext cx="1295640" cy="345960"/>
           </a:xfrm>
           <a:prstGeom prst="rect">
             <a:avLst/>
@@ -3191,17 +3227,23 @@
             <a:noFill/>
           </a:ln>
         </p:spPr>
-      </p:sp>
-      <p:sp>
-        <p:nvSpPr>
-          <p:cNvPr id="59" name="TextShape 4"/>
-          <p:cNvSpPr txBox="1"/>
+        <p:style>
+          <a:lnRef idx="0"/>
+          <a:fillRef idx="0"/>
+          <a:effectRef idx="0"/>
+          <a:fontRef idx="minor"/>
+        </p:style>
+      </p:sp>
+      <p:sp>
+        <p:nvSpPr>
+          <p:cNvPr id="59" name="CustomShape 4"/>
+          <p:cNvSpPr/>
           <p:nvPr/>
         </p:nvSpPr>
         <p:spPr>
           <a:xfrm>
             <a:off x="288000" y="2160000"/>
-            <a:ext cx="7344000" cy="602280"/>
+            <a:ext cx="7343640" cy="601920"/>
           </a:xfrm>
           <a:prstGeom prst="rect">
             <a:avLst/>
@@ -3211,14 +3253,119 @@
             <a:noFill/>
           </a:ln>
         </p:spPr>
+        <p:style>
+          <a:lnRef idx="0"/>
+          <a:fillRef idx="0"/>
+          <a:effectRef idx="0"/>
+          <a:fontRef idx="minor"/>
+        </p:style>
         <p:txBody>
           <a:bodyPr lIns="90000" rIns="90000" tIns="45000" bIns="45000"/>
           <a:p>
+            <a:pPr>
+              <a:lnSpc>
+                <a:spcPct val="100000"/>
+              </a:lnSpc>
+            </a:pPr>
             <a:r>
               <a:rPr b="0" lang="en-IN" sz="1800" spc="-1" strike="noStrike">
                 <a:latin typeface="Arial"/>
               </a:rPr>
-              <a:t>The intelligent functionality used is automatic answer evaluation using NLP technique</a:t>
+              <a:t>The intelligent functionality used in Automatic Answer Evaluation is NLP algorithm.</a:t>
+            </a:r>
+            <a:endParaRPr b="0" lang="en-IN" sz="1800" spc="-1" strike="noStrike">
+              <a:latin typeface="Arial"/>
+            </a:endParaRPr>
+          </a:p>
+          <a:p>
+            <a:pPr>
+              <a:lnSpc>
+                <a:spcPct val="100000"/>
+              </a:lnSpc>
+            </a:pPr>
+            <a:endParaRPr b="0" lang="en-IN" sz="1800" spc="-1" strike="noStrike">
+              <a:latin typeface="Arial"/>
+            </a:endParaRPr>
+          </a:p>
+          <a:p>
+            <a:pPr>
+              <a:lnSpc>
+                <a:spcPct val="100000"/>
+              </a:lnSpc>
+            </a:pPr>
+            <a:r>
+              <a:rPr b="0" lang="en-IN" sz="1800" spc="-1" strike="noStrike">
+                <a:latin typeface="Arial"/>
+              </a:rPr>
+              <a:t>We use NLP techniques to find a similarity score between 0 to 1 by comparing the model answer and the student answer. The 2 parameters are taken into consideration.</a:t>
+            </a:r>
+            <a:endParaRPr b="0" lang="en-IN" sz="1800" spc="-1" strike="noStrike">
+              <a:latin typeface="Arial"/>
+            </a:endParaRPr>
+          </a:p>
+          <a:p>
+            <a:pPr>
+              <a:lnSpc>
+                <a:spcPct val="100000"/>
+              </a:lnSpc>
+            </a:pPr>
+            <a:endParaRPr b="0" lang="en-IN" sz="1800" spc="-1" strike="noStrike">
+              <a:latin typeface="Arial"/>
+            </a:endParaRPr>
+          </a:p>
+          <a:p>
+            <a:pPr>
+              <a:lnSpc>
+                <a:spcPct val="100000"/>
+              </a:lnSpc>
+            </a:pPr>
+            <a:r>
+              <a:rPr b="0" lang="en-IN" sz="1800" spc="-1" strike="noStrike">
+                <a:latin typeface="Arial"/>
+              </a:rPr>
+              <a:t>One is Ngrams of length 3 which takes into consideration the repeated pattern of 3 words and Cosine similarity which finds out the similarity between 2 sentences by converting words into vectors.</a:t>
+            </a:r>
+            <a:endParaRPr b="0" lang="en-IN" sz="1800" spc="-1" strike="noStrike">
+              <a:latin typeface="Arial"/>
+            </a:endParaRPr>
+          </a:p>
+          <a:p>
+            <a:pPr>
+              <a:lnSpc>
+                <a:spcPct val="100000"/>
+              </a:lnSpc>
+            </a:pPr>
+            <a:endParaRPr b="0" lang="en-IN" sz="1800" spc="-1" strike="noStrike">
+              <a:latin typeface="Arial"/>
+            </a:endParaRPr>
+          </a:p>
+          <a:p>
+            <a:pPr>
+              <a:lnSpc>
+                <a:spcPct val="100000"/>
+              </a:lnSpc>
+            </a:pPr>
+            <a:r>
+              <a:rPr b="0" lang="en-IN" sz="1800" spc="-1" strike="noStrike">
+                <a:latin typeface="Arial"/>
+              </a:rPr>
+              <a:t>Second is common words between the two statements after removing common words which are known as stopwords.</a:t>
+            </a:r>
+            <a:endParaRPr b="0" lang="en-IN" sz="1800" spc="-1" strike="noStrike">
+              <a:latin typeface="Arial"/>
+            </a:endParaRPr>
+          </a:p>
+          <a:p>
+            <a:pPr>
+              <a:lnSpc>
+                <a:spcPct val="100000"/>
+              </a:lnSpc>
+            </a:pPr>
+            <a:r>
+              <a:rPr b="0" lang="en-IN" sz="1800" spc="-1" strike="noStrike">
+                <a:latin typeface="Arial"/>
+              </a:rPr>
+              <a:t> </a:t>
             </a:r>
             <a:endParaRPr b="0" lang="en-IN" sz="1800" spc="-1" strike="noStrike">
               <a:latin typeface="Arial"/>
@@ -3284,7 +3431,7 @@
         <p:spPr>
           <a:xfrm>
             <a:off x="1619640" y="3352680"/>
-            <a:ext cx="3733920" cy="707760"/>
+            <a:ext cx="3733560" cy="707400"/>
           </a:xfrm>
           <a:prstGeom prst="rect">
             <a:avLst/>
@@ -3301,7 +3448,7 @@
           <a:fontRef idx="minor"/>
         </p:style>
         <p:txBody>
-          <a:bodyPr/>
+          <a:bodyPr lIns="90000" rIns="90000" tIns="45000" bIns="45000"/>
           <a:p>
             <a:pPr algn="r">
               <a:lnSpc>

</xml_diff>